<commit_message>
Mudanças na estrutura do enum de estados
</commit_message>
<xml_diff>
--- a/Estados.pptx
+++ b/Estados.pptx
@@ -241,7 +241,7 @@
           <a:p>
             <a:fld id="{9C2042A1-6B72-46CF-8FD1-87CD61DCB12C}" type="datetimeFigureOut">
               <a:rPr lang="pt-BR" smtClean="0"/>
-              <a:t>14/12/2016</a:t>
+              <a:t>15/12/2016</a:t>
             </a:fld>
             <a:endParaRPr lang="pt-BR"/>
           </a:p>
@@ -409,7 +409,7 @@
           <a:p>
             <a:fld id="{9C2042A1-6B72-46CF-8FD1-87CD61DCB12C}" type="datetimeFigureOut">
               <a:rPr lang="pt-BR" smtClean="0"/>
-              <a:t>14/12/2016</a:t>
+              <a:t>15/12/2016</a:t>
             </a:fld>
             <a:endParaRPr lang="pt-BR"/>
           </a:p>
@@ -587,7 +587,7 @@
           <a:p>
             <a:fld id="{9C2042A1-6B72-46CF-8FD1-87CD61DCB12C}" type="datetimeFigureOut">
               <a:rPr lang="pt-BR" smtClean="0"/>
-              <a:t>14/12/2016</a:t>
+              <a:t>15/12/2016</a:t>
             </a:fld>
             <a:endParaRPr lang="pt-BR"/>
           </a:p>
@@ -755,7 +755,7 @@
           <a:p>
             <a:fld id="{9C2042A1-6B72-46CF-8FD1-87CD61DCB12C}" type="datetimeFigureOut">
               <a:rPr lang="pt-BR" smtClean="0"/>
-              <a:t>14/12/2016</a:t>
+              <a:t>15/12/2016</a:t>
             </a:fld>
             <a:endParaRPr lang="pt-BR"/>
           </a:p>
@@ -1000,7 +1000,7 @@
           <a:p>
             <a:fld id="{9C2042A1-6B72-46CF-8FD1-87CD61DCB12C}" type="datetimeFigureOut">
               <a:rPr lang="pt-BR" smtClean="0"/>
-              <a:t>14/12/2016</a:t>
+              <a:t>15/12/2016</a:t>
             </a:fld>
             <a:endParaRPr lang="pt-BR"/>
           </a:p>
@@ -1229,7 +1229,7 @@
           <a:p>
             <a:fld id="{9C2042A1-6B72-46CF-8FD1-87CD61DCB12C}" type="datetimeFigureOut">
               <a:rPr lang="pt-BR" smtClean="0"/>
-              <a:t>14/12/2016</a:t>
+              <a:t>15/12/2016</a:t>
             </a:fld>
             <a:endParaRPr lang="pt-BR"/>
           </a:p>
@@ -1593,7 +1593,7 @@
           <a:p>
             <a:fld id="{9C2042A1-6B72-46CF-8FD1-87CD61DCB12C}" type="datetimeFigureOut">
               <a:rPr lang="pt-BR" smtClean="0"/>
-              <a:t>14/12/2016</a:t>
+              <a:t>15/12/2016</a:t>
             </a:fld>
             <a:endParaRPr lang="pt-BR"/>
           </a:p>
@@ -1710,7 +1710,7 @@
           <a:p>
             <a:fld id="{9C2042A1-6B72-46CF-8FD1-87CD61DCB12C}" type="datetimeFigureOut">
               <a:rPr lang="pt-BR" smtClean="0"/>
-              <a:t>14/12/2016</a:t>
+              <a:t>15/12/2016</a:t>
             </a:fld>
             <a:endParaRPr lang="pt-BR"/>
           </a:p>
@@ -1805,7 +1805,7 @@
           <a:p>
             <a:fld id="{9C2042A1-6B72-46CF-8FD1-87CD61DCB12C}" type="datetimeFigureOut">
               <a:rPr lang="pt-BR" smtClean="0"/>
-              <a:t>14/12/2016</a:t>
+              <a:t>15/12/2016</a:t>
             </a:fld>
             <a:endParaRPr lang="pt-BR"/>
           </a:p>
@@ -2080,7 +2080,7 @@
           <a:p>
             <a:fld id="{9C2042A1-6B72-46CF-8FD1-87CD61DCB12C}" type="datetimeFigureOut">
               <a:rPr lang="pt-BR" smtClean="0"/>
-              <a:t>14/12/2016</a:t>
+              <a:t>15/12/2016</a:t>
             </a:fld>
             <a:endParaRPr lang="pt-BR"/>
           </a:p>
@@ -2332,7 +2332,7 @@
           <a:p>
             <a:fld id="{9C2042A1-6B72-46CF-8FD1-87CD61DCB12C}" type="datetimeFigureOut">
               <a:rPr lang="pt-BR" smtClean="0"/>
-              <a:t>14/12/2016</a:t>
+              <a:t>15/12/2016</a:t>
             </a:fld>
             <a:endParaRPr lang="pt-BR"/>
           </a:p>
@@ -2543,7 +2543,7 @@
           <a:p>
             <a:fld id="{9C2042A1-6B72-46CF-8FD1-87CD61DCB12C}" type="datetimeFigureOut">
               <a:rPr lang="pt-BR" smtClean="0"/>
-              <a:t>14/12/2016</a:t>
+              <a:t>15/12/2016</a:t>
             </a:fld>
             <a:endParaRPr lang="pt-BR"/>
           </a:p>

</xml_diff>